<commit_message>
actualizare aplicatie si prezentare PowerPoint
</commit_message>
<xml_diff>
--- a/Licenta2017DamianRazvan/prezentare powerpoint.pptx
+++ b/Licenta2017DamianRazvan/prezentare powerpoint.pptx
@@ -13,8 +13,9 @@
     <p:sldId id="265" r:id="rId7"/>
     <p:sldId id="261" r:id="rId8"/>
     <p:sldId id="262" r:id="rId9"/>
-    <p:sldId id="263" r:id="rId10"/>
-    <p:sldId id="264" r:id="rId11"/>
+    <p:sldId id="266" r:id="rId10"/>
+    <p:sldId id="263" r:id="rId11"/>
+    <p:sldId id="264" r:id="rId12"/>
   </p:sldIdLst>
   <p:sldSz cx="12192000" cy="6858000"/>
   <p:notesSz cx="6858000" cy="9144000"/>
@@ -627,7 +628,7 @@
           <a:p>
             <a:fld id="{625A979F-49B6-4CD9-AA52-022718B3A66D}" type="datetimeFigureOut">
               <a:rPr lang="ro-RO" smtClean="0"/>
-              <a:t>02.07.2017</a:t>
+              <a:t>03.07.2017</a:t>
             </a:fld>
             <a:endParaRPr lang="ro-RO" dirty="0"/>
           </a:p>
@@ -922,7 +923,7 @@
           <a:p>
             <a:fld id="{625A979F-49B6-4CD9-AA52-022718B3A66D}" type="datetimeFigureOut">
               <a:rPr lang="ro-RO" smtClean="0"/>
-              <a:t>02.07.2017</a:t>
+              <a:t>03.07.2017</a:t>
             </a:fld>
             <a:endParaRPr lang="ro-RO" dirty="0"/>
           </a:p>
@@ -1170,7 +1171,7 @@
           <a:p>
             <a:fld id="{625A979F-49B6-4CD9-AA52-022718B3A66D}" type="datetimeFigureOut">
               <a:rPr lang="ro-RO" smtClean="0"/>
-              <a:t>02.07.2017</a:t>
+              <a:t>03.07.2017</a:t>
             </a:fld>
             <a:endParaRPr lang="ro-RO" dirty="0"/>
           </a:p>
@@ -1710,7 +1711,7 @@
           <a:p>
             <a:fld id="{625A979F-49B6-4CD9-AA52-022718B3A66D}" type="datetimeFigureOut">
               <a:rPr lang="ro-RO" smtClean="0"/>
-              <a:t>02.07.2017</a:t>
+              <a:t>03.07.2017</a:t>
             </a:fld>
             <a:endParaRPr lang="ro-RO" dirty="0"/>
           </a:p>
@@ -1958,7 +1959,7 @@
           <a:p>
             <a:fld id="{625A979F-49B6-4CD9-AA52-022718B3A66D}" type="datetimeFigureOut">
               <a:rPr lang="ro-RO" smtClean="0"/>
-              <a:t>02.07.2017</a:t>
+              <a:t>03.07.2017</a:t>
             </a:fld>
             <a:endParaRPr lang="ro-RO" dirty="0"/>
           </a:p>
@@ -2490,7 +2491,7 @@
           <a:p>
             <a:fld id="{625A979F-49B6-4CD9-AA52-022718B3A66D}" type="datetimeFigureOut">
               <a:rPr lang="ro-RO" smtClean="0"/>
-              <a:t>02.07.2017</a:t>
+              <a:t>03.07.2017</a:t>
             </a:fld>
             <a:endParaRPr lang="ro-RO" dirty="0"/>
           </a:p>
@@ -2787,7 +2788,7 @@
           <a:p>
             <a:fld id="{625A979F-49B6-4CD9-AA52-022718B3A66D}" type="datetimeFigureOut">
               <a:rPr lang="ro-RO" smtClean="0"/>
-              <a:t>02.07.2017</a:t>
+              <a:t>03.07.2017</a:t>
             </a:fld>
             <a:endParaRPr lang="ro-RO" dirty="0"/>
           </a:p>
@@ -2961,7 +2962,7 @@
           <a:p>
             <a:fld id="{625A979F-49B6-4CD9-AA52-022718B3A66D}" type="datetimeFigureOut">
               <a:rPr lang="ro-RO" smtClean="0"/>
-              <a:t>02.07.2017</a:t>
+              <a:t>03.07.2017</a:t>
             </a:fld>
             <a:endParaRPr lang="ro-RO" dirty="0"/>
           </a:p>
@@ -3141,7 +3142,7 @@
           <a:p>
             <a:fld id="{625A979F-49B6-4CD9-AA52-022718B3A66D}" type="datetimeFigureOut">
               <a:rPr lang="ro-RO" smtClean="0"/>
-              <a:t>02.07.2017</a:t>
+              <a:t>03.07.2017</a:t>
             </a:fld>
             <a:endParaRPr lang="ro-RO" dirty="0"/>
           </a:p>
@@ -3311,7 +3312,7 @@
           <a:p>
             <a:fld id="{625A979F-49B6-4CD9-AA52-022718B3A66D}" type="datetimeFigureOut">
               <a:rPr lang="ro-RO" smtClean="0"/>
-              <a:t>02.07.2017</a:t>
+              <a:t>03.07.2017</a:t>
             </a:fld>
             <a:endParaRPr lang="ro-RO" dirty="0"/>
           </a:p>
@@ -3562,7 +3563,7 @@
           <a:p>
             <a:fld id="{625A979F-49B6-4CD9-AA52-022718B3A66D}" type="datetimeFigureOut">
               <a:rPr lang="ro-RO" smtClean="0"/>
-              <a:t>02.07.2017</a:t>
+              <a:t>03.07.2017</a:t>
             </a:fld>
             <a:endParaRPr lang="ro-RO" dirty="0"/>
           </a:p>
@@ -3859,7 +3860,7 @@
           <a:p>
             <a:fld id="{625A979F-49B6-4CD9-AA52-022718B3A66D}" type="datetimeFigureOut">
               <a:rPr lang="ro-RO" smtClean="0"/>
-              <a:t>02.07.2017</a:t>
+              <a:t>03.07.2017</a:t>
             </a:fld>
             <a:endParaRPr lang="ro-RO" dirty="0"/>
           </a:p>
@@ -4301,7 +4302,7 @@
           <a:p>
             <a:fld id="{625A979F-49B6-4CD9-AA52-022718B3A66D}" type="datetimeFigureOut">
               <a:rPr lang="ro-RO" smtClean="0"/>
-              <a:t>02.07.2017</a:t>
+              <a:t>03.07.2017</a:t>
             </a:fld>
             <a:endParaRPr lang="ro-RO" dirty="0"/>
           </a:p>
@@ -4419,7 +4420,7 @@
           <a:p>
             <a:fld id="{625A979F-49B6-4CD9-AA52-022718B3A66D}" type="datetimeFigureOut">
               <a:rPr lang="ro-RO" smtClean="0"/>
-              <a:t>02.07.2017</a:t>
+              <a:t>03.07.2017</a:t>
             </a:fld>
             <a:endParaRPr lang="ro-RO" dirty="0"/>
           </a:p>
@@ -4514,7 +4515,7 @@
           <a:p>
             <a:fld id="{625A979F-49B6-4CD9-AA52-022718B3A66D}" type="datetimeFigureOut">
               <a:rPr lang="ro-RO" smtClean="0"/>
-              <a:t>02.07.2017</a:t>
+              <a:t>03.07.2017</a:t>
             </a:fld>
             <a:endParaRPr lang="ro-RO" dirty="0"/>
           </a:p>
@@ -4797,7 +4798,7 @@
           <a:p>
             <a:fld id="{625A979F-49B6-4CD9-AA52-022718B3A66D}" type="datetimeFigureOut">
               <a:rPr lang="ro-RO" smtClean="0"/>
-              <a:t>02.07.2017</a:t>
+              <a:t>03.07.2017</a:t>
             </a:fld>
             <a:endParaRPr lang="ro-RO" dirty="0"/>
           </a:p>
@@ -5087,7 +5088,7 @@
           <a:p>
             <a:fld id="{625A979F-49B6-4CD9-AA52-022718B3A66D}" type="datetimeFigureOut">
               <a:rPr lang="ro-RO" smtClean="0"/>
-              <a:t>02.07.2017</a:t>
+              <a:t>03.07.2017</a:t>
             </a:fld>
             <a:endParaRPr lang="ro-RO" dirty="0"/>
           </a:p>
@@ -5617,7 +5618,7 @@
           <a:p>
             <a:fld id="{625A979F-49B6-4CD9-AA52-022718B3A66D}" type="datetimeFigureOut">
               <a:rPr lang="ro-RO" smtClean="0"/>
-              <a:t>02.07.2017</a:t>
+              <a:t>03.07.2017</a:t>
             </a:fld>
             <a:endParaRPr lang="ro-RO" dirty="0"/>
           </a:p>
@@ -6207,6 +6208,55 @@
           </a:p>
         </p:txBody>
       </p:sp>
+      <p:sp>
+        <p:nvSpPr>
+          <p:cNvPr id="4" name="TextBox 3">
+            <a:extLst>
+              <a:ext uri="{FF2B5EF4-FFF2-40B4-BE49-F238E27FC236}">
+                <a16:creationId xmlns:a16="http://schemas.microsoft.com/office/drawing/2014/main" id="{2DC4D8CA-2211-444D-B1BC-9F8AF9B2DC54}"/>
+              </a:ext>
+            </a:extLst>
+          </p:cNvPr>
+          <p:cNvSpPr txBox="1"/>
+          <p:nvPr/>
+        </p:nvSpPr>
+        <p:spPr>
+          <a:xfrm>
+            <a:off x="6063175" y="5384801"/>
+            <a:ext cx="4854787" cy="646331"/>
+          </a:xfrm>
+          <a:prstGeom prst="rect">
+            <a:avLst/>
+          </a:prstGeom>
+          <a:noFill/>
+        </p:spPr>
+        <p:txBody>
+          <a:bodyPr wrap="square" rtlCol="0">
+            <a:spAutoFit/>
+          </a:bodyPr>
+          <a:lstStyle/>
+          <a:p>
+            <a:r>
+              <a:rPr lang="ro-RO" dirty="0"/>
+              <a:t>Student: </a:t>
+            </a:r>
+            <a:r>
+              <a:rPr lang="ro-RO" b="1" i="1" dirty="0"/>
+              <a:t>Damian Răzvan Codrin</a:t>
+            </a:r>
+          </a:p>
+          <a:p>
+            <a:r>
+              <a:rPr lang="ro-RO" dirty="0"/>
+              <a:t>Coordonator științific: </a:t>
+            </a:r>
+            <a:r>
+              <a:rPr lang="ro-RO" b="1" i="1" dirty="0"/>
+              <a:t>Lector, Dr. Ionuț Pistol</a:t>
+            </a:r>
+          </a:p>
+        </p:txBody>
+      </p:sp>
     </p:spTree>
     <p:extLst>
       <p:ext uri="{BB962C8B-B14F-4D97-AF65-F5344CB8AC3E}">
@@ -6221,6 +6271,70 @@
 </file>
 
 <file path=ppt/slides/slide10.xml><?xml version="1.0" encoding="utf-8"?>
+<p:sld xmlns:a="http://schemas.openxmlformats.org/drawingml/2006/main" xmlns:r="http://schemas.openxmlformats.org/officeDocument/2006/relationships" xmlns:p="http://schemas.openxmlformats.org/presentationml/2006/main">
+  <p:cSld>
+    <p:spTree>
+      <p:nvGrpSpPr>
+        <p:cNvPr id="1" name=""/>
+        <p:cNvGrpSpPr/>
+        <p:nvPr/>
+      </p:nvGrpSpPr>
+      <p:grpSpPr>
+        <a:xfrm>
+          <a:off x="0" y="0"/>
+          <a:ext cx="0" cy="0"/>
+          <a:chOff x="0" y="0"/>
+          <a:chExt cx="0" cy="0"/>
+        </a:xfrm>
+      </p:grpSpPr>
+      <p:sp>
+        <p:nvSpPr>
+          <p:cNvPr id="2" name="Title 1">
+            <a:extLst>
+              <a:ext uri="{FF2B5EF4-FFF2-40B4-BE49-F238E27FC236}">
+                <a16:creationId xmlns:a16="http://schemas.microsoft.com/office/drawing/2014/main" id="{D0C75727-C451-4CD0-91D5-E82554769BB6}"/>
+              </a:ext>
+            </a:extLst>
+          </p:cNvPr>
+          <p:cNvSpPr>
+            <a:spLocks noGrp="1"/>
+          </p:cNvSpPr>
+          <p:nvPr>
+            <p:ph type="title"/>
+          </p:nvPr>
+        </p:nvSpPr>
+        <p:spPr>
+          <a:xfrm>
+            <a:off x="1308821" y="2477654"/>
+            <a:ext cx="10018713" cy="1752599"/>
+          </a:xfrm>
+        </p:spPr>
+        <p:txBody>
+          <a:bodyPr/>
+          <a:lstStyle/>
+          <a:p>
+            <a:r>
+              <a:rPr lang="en-US" dirty="0"/>
+              <a:t>Demo</a:t>
+            </a:r>
+            <a:endParaRPr lang="ro-RO" dirty="0"/>
+          </a:p>
+        </p:txBody>
+      </p:sp>
+    </p:spTree>
+    <p:extLst>
+      <p:ext uri="{BB962C8B-B14F-4D97-AF65-F5344CB8AC3E}">
+        <p14:creationId xmlns:p14="http://schemas.microsoft.com/office/powerpoint/2010/main" val="3791227300"/>
+      </p:ext>
+    </p:extLst>
+  </p:cSld>
+  <p:clrMapOvr>
+    <a:masterClrMapping/>
+  </p:clrMapOvr>
+</p:sld>
+</file>
+
+<file path=ppt/slides/slide11.xml><?xml version="1.0" encoding="utf-8"?>
 <p:sld xmlns:a="http://schemas.openxmlformats.org/drawingml/2006/main" xmlns:r="http://schemas.openxmlformats.org/officeDocument/2006/relationships" xmlns:p="http://schemas.openxmlformats.org/presentationml/2006/main">
   <p:cSld>
     <p:spTree>
@@ -7233,8 +7347,8 @@
         </p:blipFill>
         <p:spPr>
           <a:xfrm>
-            <a:off x="3371273" y="101600"/>
-            <a:ext cx="5994400" cy="6650182"/>
+            <a:off x="3207434" y="0"/>
+            <a:ext cx="6485206" cy="6858000"/>
           </a:xfrm>
           <a:prstGeom prst="rect">
             <a:avLst/>
@@ -7271,44 +7385,128 @@
           <a:chExt cx="0" cy="0"/>
         </a:xfrm>
       </p:grpSpPr>
-      <p:sp>
-        <p:nvSpPr>
-          <p:cNvPr id="2" name="Title 1">
+      <p:pic>
+        <p:nvPicPr>
+          <p:cNvPr id="4" name="Content Placeholder 3">
             <a:extLst>
               <a:ext uri="{FF2B5EF4-FFF2-40B4-BE49-F238E27FC236}">
-                <a16:creationId xmlns:a16="http://schemas.microsoft.com/office/drawing/2014/main" id="{D0C75727-C451-4CD0-91D5-E82554769BB6}"/>
+                <a16:creationId xmlns:a16="http://schemas.microsoft.com/office/drawing/2014/main" id="{854EA8B8-9344-4C1B-B097-8307C4D8B347}"/>
               </a:ext>
             </a:extLst>
           </p:cNvPr>
-          <p:cNvSpPr>
-            <a:spLocks noGrp="1"/>
-          </p:cNvSpPr>
-          <p:nvPr>
-            <p:ph type="title"/>
-          </p:nvPr>
+          <p:cNvPicPr>
+            <a:picLocks noGrp="1"/>
+          </p:cNvPicPr>
+          <p:nvPr>
+            <p:ph idx="1"/>
+          </p:nvPr>
+        </p:nvPicPr>
+        <p:blipFill>
+          <a:blip r:embed="rId2">
+            <a:extLst>
+              <a:ext uri="{28A0092B-C50C-407E-A947-70E740481C1C}">
+                <a14:useLocalDpi xmlns:a14="http://schemas.microsoft.com/office/drawing/2010/main" val="0"/>
+              </a:ext>
+            </a:extLst>
+          </a:blip>
+          <a:srcRect/>
+          <a:stretch>
+            <a:fillRect/>
+          </a:stretch>
+        </p:blipFill>
+        <p:spPr bwMode="auto">
+          <a:xfrm>
+            <a:off x="1392703" y="1181686"/>
+            <a:ext cx="6639949" cy="4712677"/>
+          </a:xfrm>
+          <a:prstGeom prst="rect">
+            <a:avLst/>
+          </a:prstGeom>
+          <a:noFill/>
+          <a:ln>
+            <a:noFill/>
+          </a:ln>
+        </p:spPr>
+      </p:pic>
+      <p:sp>
+        <p:nvSpPr>
+          <p:cNvPr id="5" name="TextBox 4">
+            <a:extLst>
+              <a:ext uri="{FF2B5EF4-FFF2-40B4-BE49-F238E27FC236}">
+                <a16:creationId xmlns:a16="http://schemas.microsoft.com/office/drawing/2014/main" id="{E2D8CAE2-9089-4D0E-A9B5-BA78CDBCFCD5}"/>
+              </a:ext>
+            </a:extLst>
+          </p:cNvPr>
+          <p:cNvSpPr txBox="1"/>
+          <p:nvPr/>
         </p:nvSpPr>
         <p:spPr>
           <a:xfrm>
-            <a:off x="1308821" y="2477654"/>
-            <a:ext cx="10018713" cy="1752599"/>
+            <a:off x="8187396" y="1899138"/>
+            <a:ext cx="4004603" cy="3539430"/>
           </a:xfrm>
+          <a:prstGeom prst="rect">
+            <a:avLst/>
+          </a:prstGeom>
+          <a:noFill/>
         </p:spPr>
         <p:txBody>
-          <a:bodyPr/>
-          <a:lstStyle/>
-          <a:p>
-            <a:r>
-              <a:rPr lang="en-US" dirty="0"/>
-              <a:t>Demo</a:t>
-            </a:r>
-            <a:endParaRPr lang="ro-RO" dirty="0"/>
+          <a:bodyPr wrap="square" rtlCol="0">
+            <a:spAutoFit/>
+          </a:bodyPr>
+          <a:lstStyle/>
+          <a:p>
+            <a:r>
+              <a:rPr lang="en-US" sz="2800" dirty="0"/>
+              <a:t>nodes = [</a:t>
+            </a:r>
+          </a:p>
+          <a:p>
+            <a:r>
+              <a:rPr lang="en-US" sz="2800" dirty="0"/>
+              <a:t>	{id: 1, label: ‘node 1’},</a:t>
+            </a:r>
+          </a:p>
+          <a:p>
+            <a:r>
+              <a:rPr lang="en-US" sz="2800" dirty="0"/>
+              <a:t>	{id: 2, label: ‘node 2’}</a:t>
+            </a:r>
+          </a:p>
+          <a:p>
+            <a:r>
+              <a:rPr lang="en-US" sz="2800" dirty="0"/>
+              <a:t>];</a:t>
+            </a:r>
+          </a:p>
+          <a:p>
+            <a:endParaRPr lang="en-US" sz="2800" dirty="0"/>
+          </a:p>
+          <a:p>
+            <a:r>
+              <a:rPr lang="en-US" sz="2800" dirty="0"/>
+              <a:t>edges = [</a:t>
+            </a:r>
+          </a:p>
+          <a:p>
+            <a:r>
+              <a:rPr lang="en-US" sz="2800" dirty="0"/>
+              <a:t>	{id: 1, from:1, to:2}</a:t>
+            </a:r>
+          </a:p>
+          <a:p>
+            <a:r>
+              <a:rPr lang="en-US" sz="2800" dirty="0"/>
+              <a:t>];</a:t>
+            </a:r>
+            <a:endParaRPr lang="ro-RO" sz="2800" dirty="0"/>
           </a:p>
         </p:txBody>
       </p:sp>
     </p:spTree>
     <p:extLst>
       <p:ext uri="{BB962C8B-B14F-4D97-AF65-F5344CB8AC3E}">
-        <p14:creationId xmlns:p14="http://schemas.microsoft.com/office/powerpoint/2010/main" val="3791227300"/>
+        <p14:creationId xmlns:p14="http://schemas.microsoft.com/office/powerpoint/2010/main" val="931361059"/>
       </p:ext>
     </p:extLst>
   </p:cSld>

</xml_diff>